<commit_message>
Story 4: Changed presantation
</commit_message>
<xml_diff>
--- a/Homework_8/Kanban_Vlad_Dmytrenko.pptx
+++ b/Homework_8/Kanban_Vlad_Dmytrenko.pptx
@@ -126,7 +126,7 @@
                 </a:uFill>
                 <a:latin typeface="Times New Roman"/>
               </a:rPr>
-              <a:t> </a:t>
+              <a:t>&lt;заголовок&gt;</a:t>
             </a:r>
             <a:endParaRPr b="0" lang="ru-RU" sz="1400" spc="-1" strike="noStrike">
               <a:solidFill>
@@ -177,7 +177,7 @@
                 </a:uFill>
                 <a:latin typeface="Times New Roman"/>
               </a:rPr>
-              <a:t> </a:t>
+              <a:t>&lt;дата/время&gt;</a:t>
             </a:r>
             <a:endParaRPr b="0" lang="ru-RU" sz="1400" spc="-1" strike="noStrike">
               <a:solidFill>
@@ -227,7 +227,7 @@
                 </a:uFill>
                 <a:latin typeface="Times New Roman"/>
               </a:rPr>
-              <a:t> </a:t>
+              <a:t>&lt;нижний колонтитул&gt;</a:t>
             </a:r>
             <a:endParaRPr b="0" lang="ru-RU" sz="1400" spc="-1" strike="noStrike">
               <a:solidFill>
@@ -266,7 +266,7 @@
           <a:bodyPr lIns="0" rIns="0" tIns="0" bIns="0" anchor="b"/>
           <a:p>
             <a:pPr algn="r"/>
-            <a:fld id="{A081CA89-C836-4A0F-B26D-0C0F473B920B}" type="slidenum">
+            <a:fld id="{996024CF-03B4-46FE-923E-F4D2E28DFC8B}" type="slidenum">
               <a:rPr b="0" lang="ru-RU" sz="1400" spc="-1" strike="noStrike">
                 <a:solidFill>
                   <a:srgbClr val="000000"/>
@@ -278,7 +278,7 @@
                 </a:uFill>
                 <a:latin typeface="Times New Roman"/>
               </a:rPr>
-              <a:t>1</a:t>
+              <a:t>&lt;номер&gt;</a:t>
             </a:fld>
             <a:endParaRPr b="0" lang="ru-RU" sz="1400" spc="-1" strike="noStrike">
               <a:solidFill>
@@ -330,7 +330,7 @@
         <p:spPr>
           <a:xfrm>
             <a:off x="685800" y="4400640"/>
-            <a:ext cx="5485320" cy="3599280"/>
+            <a:ext cx="5484600" cy="3598560"/>
           </a:xfrm>
           <a:prstGeom prst="rect">
             <a:avLst/>
@@ -362,7 +362,7 @@
         <p:spPr>
           <a:xfrm>
             <a:off x="3884760" y="8685360"/>
-            <a:ext cx="2970720" cy="457560"/>
+            <a:ext cx="2970000" cy="456840"/>
           </a:xfrm>
           <a:prstGeom prst="rect">
             <a:avLst/>
@@ -414,7 +414,7 @@
         <p:spPr>
           <a:xfrm>
             <a:off x="685800" y="4400640"/>
-            <a:ext cx="5485320" cy="3599280"/>
+            <a:ext cx="5484600" cy="3598560"/>
           </a:xfrm>
           <a:prstGeom prst="rect">
             <a:avLst/>
@@ -446,7 +446,7 @@
         <p:spPr>
           <a:xfrm>
             <a:off x="3884760" y="8685360"/>
-            <a:ext cx="2970720" cy="457560"/>
+            <a:ext cx="2970000" cy="456840"/>
           </a:xfrm>
           <a:prstGeom prst="rect">
             <a:avLst/>
@@ -498,7 +498,7 @@
         <p:spPr>
           <a:xfrm>
             <a:off x="685800" y="4400640"/>
-            <a:ext cx="5485320" cy="3599280"/>
+            <a:ext cx="5484600" cy="3598560"/>
           </a:xfrm>
           <a:prstGeom prst="rect">
             <a:avLst/>
@@ -530,7 +530,7 @@
         <p:spPr>
           <a:xfrm>
             <a:off x="3884760" y="8685360"/>
-            <a:ext cx="2970720" cy="457560"/>
+            <a:ext cx="2970000" cy="456840"/>
           </a:xfrm>
           <a:prstGeom prst="rect">
             <a:avLst/>
@@ -582,7 +582,7 @@
         <p:spPr>
           <a:xfrm>
             <a:off x="685800" y="4400640"/>
-            <a:ext cx="5485320" cy="3599280"/>
+            <a:ext cx="5484600" cy="3598560"/>
           </a:xfrm>
           <a:prstGeom prst="rect">
             <a:avLst/>
@@ -614,7 +614,7 @@
         <p:spPr>
           <a:xfrm>
             <a:off x="3884760" y="8685360"/>
-            <a:ext cx="2970720" cy="457560"/>
+            <a:ext cx="2970000" cy="456840"/>
           </a:xfrm>
           <a:prstGeom prst="rect">
             <a:avLst/>
@@ -666,7 +666,7 @@
         <p:spPr>
           <a:xfrm>
             <a:off x="685800" y="4400640"/>
-            <a:ext cx="5485320" cy="3599280"/>
+            <a:ext cx="5484600" cy="3598560"/>
           </a:xfrm>
           <a:prstGeom prst="rect">
             <a:avLst/>
@@ -698,7 +698,7 @@
         <p:spPr>
           <a:xfrm>
             <a:off x="3884760" y="8685360"/>
-            <a:ext cx="2970720" cy="457560"/>
+            <a:ext cx="2970000" cy="456840"/>
           </a:xfrm>
           <a:prstGeom prst="rect">
             <a:avLst/>
@@ -750,7 +750,7 @@
         <p:spPr>
           <a:xfrm>
             <a:off x="685800" y="4400640"/>
-            <a:ext cx="5485320" cy="3599280"/>
+            <a:ext cx="5484600" cy="3598560"/>
           </a:xfrm>
           <a:prstGeom prst="rect">
             <a:avLst/>
@@ -782,7 +782,7 @@
         <p:spPr>
           <a:xfrm>
             <a:off x="3884760" y="8685360"/>
-            <a:ext cx="2970720" cy="457560"/>
+            <a:ext cx="2970000" cy="456840"/>
           </a:xfrm>
           <a:prstGeom prst="rect">
             <a:avLst/>
@@ -834,7 +834,7 @@
         <p:spPr>
           <a:xfrm>
             <a:off x="685800" y="4400640"/>
-            <a:ext cx="5485320" cy="3599280"/>
+            <a:ext cx="5484600" cy="3598560"/>
           </a:xfrm>
           <a:prstGeom prst="rect">
             <a:avLst/>
@@ -866,7 +866,7 @@
         <p:spPr>
           <a:xfrm>
             <a:off x="3884760" y="8685360"/>
-            <a:ext cx="2970720" cy="457560"/>
+            <a:ext cx="2970000" cy="456840"/>
           </a:xfrm>
           <a:prstGeom prst="rect">
             <a:avLst/>
@@ -918,7 +918,7 @@
         <p:spPr>
           <a:xfrm>
             <a:off x="685800" y="4400640"/>
-            <a:ext cx="5485320" cy="3599280"/>
+            <a:ext cx="5484600" cy="3598560"/>
           </a:xfrm>
           <a:prstGeom prst="rect">
             <a:avLst/>
@@ -950,7 +950,7 @@
         <p:spPr>
           <a:xfrm>
             <a:off x="3884760" y="8685360"/>
-            <a:ext cx="2970720" cy="457560"/>
+            <a:ext cx="2970000" cy="456840"/>
           </a:xfrm>
           <a:prstGeom prst="rect">
             <a:avLst/>
@@ -1002,7 +1002,7 @@
         <p:spPr>
           <a:xfrm>
             <a:off x="685800" y="4400640"/>
-            <a:ext cx="5485320" cy="3599280"/>
+            <a:ext cx="5484600" cy="3598560"/>
           </a:xfrm>
           <a:prstGeom prst="rect">
             <a:avLst/>
@@ -1034,7 +1034,7 @@
         <p:spPr>
           <a:xfrm>
             <a:off x="3884760" y="8685360"/>
-            <a:ext cx="2970720" cy="457560"/>
+            <a:ext cx="2970000" cy="456840"/>
           </a:xfrm>
           <a:prstGeom prst="rect">
             <a:avLst/>
@@ -1086,7 +1086,7 @@
         <p:spPr>
           <a:xfrm>
             <a:off x="685800" y="4400640"/>
-            <a:ext cx="5485320" cy="3599280"/>
+            <a:ext cx="5484600" cy="3598560"/>
           </a:xfrm>
           <a:prstGeom prst="rect">
             <a:avLst/>
@@ -1118,7 +1118,7 @@
         <p:spPr>
           <a:xfrm>
             <a:off x="3884760" y="8685360"/>
-            <a:ext cx="2970720" cy="457560"/>
+            <a:ext cx="2970000" cy="456840"/>
           </a:xfrm>
           <a:prstGeom prst="rect">
             <a:avLst/>
@@ -4127,8 +4127,8 @@
         </p:nvSpPr>
         <p:spPr>
           <a:xfrm>
-            <a:off x="609480" y="221040"/>
-            <a:ext cx="10972080" cy="1249920"/>
+            <a:off x="609480" y="273600"/>
+            <a:ext cx="10972440" cy="1144800"/>
           </a:xfrm>
           <a:prstGeom prst="rect">
             <a:avLst/>
@@ -4138,6 +4138,34 @@
           <a:bodyPr lIns="0" rIns="0" tIns="0" bIns="0" anchor="ctr"/>
           <a:p>
             <a:pPr algn="ctr"/>
+            <a:r>
+              <a:rPr b="0" lang="ru-RU" sz="4400" spc="-1" strike="noStrike">
+                <a:solidFill>
+                  <a:srgbClr val="000000"/>
+                </a:solidFill>
+                <a:uFill>
+                  <a:solidFill>
+                    <a:srgbClr val="ffffff"/>
+                  </a:solidFill>
+                </a:uFill>
+                <a:latin typeface="Arial"/>
+              </a:rPr>
+              <a:t>Для правки текста заголовка </a:t>
+            </a:r>
+            <a:r>
+              <a:rPr b="0" lang="ru-RU" sz="4400" spc="-1" strike="noStrike">
+                <a:solidFill>
+                  <a:srgbClr val="000000"/>
+                </a:solidFill>
+                <a:uFill>
+                  <a:solidFill>
+                    <a:srgbClr val="ffffff"/>
+                  </a:solidFill>
+                </a:uFill>
+                <a:latin typeface="Arial"/>
+              </a:rPr>
+              <a:t>щёлкните мышью</a:t>
+            </a:r>
             <a:endParaRPr b="0" lang="ru-RU" sz="4400" spc="-1" strike="noStrike">
               <a:solidFill>
                 <a:srgbClr val="000000"/>
@@ -4165,7 +4193,7 @@
         <p:spPr>
           <a:xfrm>
             <a:off x="609480" y="1604520"/>
-            <a:ext cx="10972080" cy="3976920"/>
+            <a:ext cx="10972440" cy="3977280"/>
           </a:xfrm>
           <a:prstGeom prst="rect">
             <a:avLst/>
@@ -4183,7 +4211,7 @@
               <a:buChar char=""/>
             </a:pPr>
             <a:r>
-              <a:rPr b="0" lang="ru-RU" sz="1800" spc="-1" strike="noStrike">
+              <a:rPr b="0" lang="ru-RU" sz="3200" spc="-1" strike="noStrike">
                 <a:solidFill>
                   <a:srgbClr val="000000"/>
                 </a:solidFill>
@@ -4196,7 +4224,7 @@
               </a:rPr>
               <a:t>Для правки структуры щёлкните мышью</a:t>
             </a:r>
-            <a:endParaRPr b="0" lang="ru-RU" sz="1800" spc="-1" strike="noStrike">
+            <a:endParaRPr b="0" lang="ru-RU" sz="3200" spc="-1" strike="noStrike">
               <a:solidFill>
                 <a:srgbClr val="000000"/>
               </a:solidFill>
@@ -4218,7 +4246,7 @@
               <a:buChar char=""/>
             </a:pPr>
             <a:r>
-              <a:rPr b="0" lang="ru-RU" sz="1800" spc="-1" strike="noStrike">
+              <a:rPr b="0" lang="ru-RU" sz="2800" spc="-1" strike="noStrike">
                 <a:solidFill>
                   <a:srgbClr val="000000"/>
                 </a:solidFill>
@@ -4231,7 +4259,7 @@
               </a:rPr>
               <a:t>Второй уровень структуры</a:t>
             </a:r>
-            <a:endParaRPr b="0" lang="ru-RU" sz="1800" spc="-1" strike="noStrike">
+            <a:endParaRPr b="0" lang="ru-RU" sz="2800" spc="-1" strike="noStrike">
               <a:solidFill>
                 <a:srgbClr val="000000"/>
               </a:solidFill>
@@ -4253,7 +4281,7 @@
               <a:buChar char=""/>
             </a:pPr>
             <a:r>
-              <a:rPr b="0" lang="ru-RU" sz="1800" spc="-1" strike="noStrike">
+              <a:rPr b="0" lang="ru-RU" sz="2400" spc="-1" strike="noStrike">
                 <a:solidFill>
                   <a:srgbClr val="000000"/>
                 </a:solidFill>
@@ -4266,7 +4294,7 @@
               </a:rPr>
               <a:t>Третий уровень структуры</a:t>
             </a:r>
-            <a:endParaRPr b="0" lang="ru-RU" sz="1800" spc="-1" strike="noStrike">
+            <a:endParaRPr b="0" lang="ru-RU" sz="2400" spc="-1" strike="noStrike">
               <a:solidFill>
                 <a:srgbClr val="000000"/>
               </a:solidFill>
@@ -4288,7 +4316,7 @@
               <a:buChar char=""/>
             </a:pPr>
             <a:r>
-              <a:rPr b="0" lang="ru-RU" sz="1800" spc="-1" strike="noStrike">
+              <a:rPr b="0" lang="ru-RU" sz="2000" spc="-1" strike="noStrike">
                 <a:solidFill>
                   <a:srgbClr val="000000"/>
                 </a:solidFill>
@@ -4301,7 +4329,7 @@
               </a:rPr>
               <a:t>Четвёртый уровень структуры</a:t>
             </a:r>
-            <a:endParaRPr b="0" lang="ru-RU" sz="1800" spc="-1" strike="noStrike">
+            <a:endParaRPr b="0" lang="ru-RU" sz="2000" spc="-1" strike="noStrike">
               <a:solidFill>
                 <a:srgbClr val="000000"/>
               </a:solidFill>
@@ -4323,7 +4351,7 @@
               <a:buChar char=""/>
             </a:pPr>
             <a:r>
-              <a:rPr b="0" lang="ru-RU" sz="1800" spc="-1" strike="noStrike">
+              <a:rPr b="0" lang="ru-RU" sz="2000" spc="-1" strike="noStrike">
                 <a:solidFill>
                   <a:srgbClr val="000000"/>
                 </a:solidFill>
@@ -4336,7 +4364,7 @@
               </a:rPr>
               <a:t>Пятый уровень структуры</a:t>
             </a:r>
-            <a:endParaRPr b="0" lang="ru-RU" sz="1800" spc="-1" strike="noStrike">
+            <a:endParaRPr b="0" lang="ru-RU" sz="2000" spc="-1" strike="noStrike">
               <a:solidFill>
                 <a:srgbClr val="000000"/>
               </a:solidFill>
@@ -4358,7 +4386,7 @@
               <a:buChar char=""/>
             </a:pPr>
             <a:r>
-              <a:rPr b="0" lang="ru-RU" sz="1800" spc="-1" strike="noStrike">
+              <a:rPr b="0" lang="ru-RU" sz="2000" spc="-1" strike="noStrike">
                 <a:solidFill>
                   <a:srgbClr val="000000"/>
                 </a:solidFill>
@@ -4371,7 +4399,7 @@
               </a:rPr>
               <a:t>Шестой уровень структуры</a:t>
             </a:r>
-            <a:endParaRPr b="0" lang="ru-RU" sz="1800" spc="-1" strike="noStrike">
+            <a:endParaRPr b="0" lang="ru-RU" sz="2000" spc="-1" strike="noStrike">
               <a:solidFill>
                 <a:srgbClr val="000000"/>
               </a:solidFill>
@@ -4393,7 +4421,7 @@
               <a:buChar char=""/>
             </a:pPr>
             <a:r>
-              <a:rPr b="0" lang="ru-RU" sz="1800" spc="-1" strike="noStrike">
+              <a:rPr b="0" lang="ru-RU" sz="2000" spc="-1" strike="noStrike">
                 <a:solidFill>
                   <a:srgbClr val="000000"/>
                 </a:solidFill>
@@ -4406,7 +4434,7 @@
               </a:rPr>
               <a:t>Седьмой уровень структуры</a:t>
             </a:r>
-            <a:endParaRPr b="0" lang="ru-RU" sz="1800" spc="-1" strike="noStrike">
+            <a:endParaRPr b="0" lang="ru-RU" sz="2000" spc="-1" strike="noStrike">
               <a:solidFill>
                 <a:srgbClr val="000000"/>
               </a:solidFill>
@@ -4832,7 +4860,7 @@
         <p:spPr>
           <a:xfrm>
             <a:off x="1523880" y="1041480"/>
-            <a:ext cx="9142920" cy="2386440"/>
+            <a:ext cx="9142200" cy="2385720"/>
           </a:xfrm>
           <a:prstGeom prst="rect">
             <a:avLst/>
@@ -4894,7 +4922,7 @@
         <p:spPr>
           <a:xfrm>
             <a:off x="1523880" y="3602160"/>
-            <a:ext cx="9142920" cy="1654560"/>
+            <a:ext cx="9142200" cy="1653840"/>
           </a:xfrm>
           <a:prstGeom prst="rect">
             <a:avLst/>
@@ -4949,7 +4977,7 @@
       </p:sp>
     </p:spTree>
   </p:cSld>
-  <p:transition spd="med" advTm="10000">
+  <p:transition spd="med">
     <p:wipe dir="u"/>
   </p:transition>
   <p:timing>
@@ -5008,7 +5036,7 @@
         <p:spPr>
           <a:xfrm>
             <a:off x="1483200" y="115560"/>
-            <a:ext cx="9028800" cy="1324440"/>
+            <a:ext cx="9028080" cy="1323720"/>
           </a:xfrm>
           <a:prstGeom prst="rect">
             <a:avLst/>
@@ -5070,7 +5098,7 @@
         <p:spPr>
           <a:xfrm>
             <a:off x="937440" y="1407960"/>
-            <a:ext cx="9790560" cy="4784040"/>
+            <a:ext cx="9789840" cy="4783320"/>
           </a:xfrm>
           <a:prstGeom prst="rect">
             <a:avLst/>
@@ -5089,7 +5117,7 @@
         <p:txBody>
           <a:bodyPr lIns="90000" rIns="90000" tIns="45000" bIns="45000"/>
           <a:p>
-            <a:pPr marL="228600" indent="-227520">
+            <a:pPr marL="228600" indent="-226800">
               <a:lnSpc>
                 <a:spcPct val="90000"/>
               </a:lnSpc>
@@ -5127,7 +5155,7 @@
             </a:endParaRPr>
           </a:p>
           <a:p>
-            <a:pPr marL="228600" indent="-227520">
+            <a:pPr marL="228600" indent="-226800">
               <a:lnSpc>
                 <a:spcPct val="90000"/>
               </a:lnSpc>
@@ -5165,7 +5193,7 @@
             </a:endParaRPr>
           </a:p>
           <a:p>
-            <a:pPr marL="228600" indent="-227520">
+            <a:pPr marL="228600" indent="-226800">
               <a:lnSpc>
                 <a:spcPct val="90000"/>
               </a:lnSpc>
@@ -5203,7 +5231,7 @@
             </a:endParaRPr>
           </a:p>
           <a:p>
-            <a:pPr marL="228600" indent="-227520">
+            <a:pPr marL="228600" indent="-226800">
               <a:lnSpc>
                 <a:spcPct val="90000"/>
               </a:lnSpc>
@@ -5241,7 +5269,7 @@
             </a:endParaRPr>
           </a:p>
           <a:p>
-            <a:pPr marL="228600" indent="-227520">
+            <a:pPr marL="228600" indent="-226800">
               <a:lnSpc>
                 <a:spcPct val="100000"/>
               </a:lnSpc>
@@ -5280,7 +5308,7 @@
             </a:endParaRPr>
           </a:p>
           <a:p>
-            <a:pPr marL="228600" indent="-227520">
+            <a:pPr marL="228600" indent="-226800">
               <a:lnSpc>
                 <a:spcPct val="100000"/>
               </a:lnSpc>
@@ -5322,7 +5350,7 @@
       </p:sp>
     </p:spTree>
   </p:cSld>
-  <p:transition spd="med" advTm="10000">
+  <p:transition spd="med">
     <p:wipe dir="u"/>
   </p:transition>
   <p:timing>
@@ -5381,7 +5409,7 @@
         <p:spPr>
           <a:xfrm>
             <a:off x="2324160" y="365040"/>
-            <a:ext cx="9028800" cy="1324440"/>
+            <a:ext cx="9028080" cy="1323720"/>
           </a:xfrm>
           <a:prstGeom prst="rect">
             <a:avLst/>
@@ -5443,7 +5471,7 @@
         <p:spPr>
           <a:xfrm>
             <a:off x="1562040" y="1825560"/>
-            <a:ext cx="9790560" cy="4350240"/>
+            <a:ext cx="9789840" cy="4349520"/>
           </a:xfrm>
           <a:prstGeom prst="rect">
             <a:avLst/>
@@ -5528,7 +5556,7 @@
             </a:endParaRPr>
           </a:p>
           <a:p>
-            <a:pPr marL="514440" indent="-513360">
+            <a:pPr marL="514440" indent="-512640">
               <a:lnSpc>
                 <a:spcPct val="100000"/>
               </a:lnSpc>
@@ -5566,7 +5594,7 @@
             </a:endParaRPr>
           </a:p>
           <a:p>
-            <a:pPr marL="514440" indent="-513360">
+            <a:pPr marL="514440" indent="-512640">
               <a:lnSpc>
                 <a:spcPct val="100000"/>
               </a:lnSpc>
@@ -5604,7 +5632,7 @@
             </a:endParaRPr>
           </a:p>
           <a:p>
-            <a:pPr marL="514440" indent="-513360">
+            <a:pPr marL="514440" indent="-512640">
               <a:lnSpc>
                 <a:spcPct val="100000"/>
               </a:lnSpc>
@@ -5645,7 +5673,7 @@
       </p:sp>
     </p:spTree>
   </p:cSld>
-  <p:transition spd="med" advTm="10000">
+  <p:transition spd="med">
     <p:wipe dir="u"/>
   </p:transition>
   <p:timing>
@@ -5704,7 +5732,7 @@
         <p:spPr>
           <a:xfrm>
             <a:off x="2324160" y="365040"/>
-            <a:ext cx="9028800" cy="1324440"/>
+            <a:ext cx="9028080" cy="1323720"/>
           </a:xfrm>
           <a:prstGeom prst="rect">
             <a:avLst/>
@@ -5766,7 +5794,7 @@
         <p:spPr>
           <a:xfrm>
             <a:off x="1562040" y="1825560"/>
-            <a:ext cx="9790560" cy="4326840"/>
+            <a:ext cx="9789840" cy="4326120"/>
           </a:xfrm>
           <a:prstGeom prst="rect">
             <a:avLst/>
@@ -5821,7 +5849,7 @@
       </p:sp>
     </p:spTree>
   </p:cSld>
-  <p:transition spd="med" advTm="10000">
+  <p:transition spd="med">
     <p:wipe dir="u"/>
   </p:transition>
   <p:timing>
@@ -5880,7 +5908,7 @@
         <p:spPr>
           <a:xfrm>
             <a:off x="2324160" y="365040"/>
-            <a:ext cx="9028800" cy="1324440"/>
+            <a:ext cx="9028080" cy="1323720"/>
           </a:xfrm>
           <a:prstGeom prst="rect">
             <a:avLst/>
@@ -5946,7 +5974,7 @@
         <p:spPr>
           <a:xfrm>
             <a:off x="4462920" y="1690560"/>
-            <a:ext cx="3988800" cy="1765800"/>
+            <a:ext cx="3988080" cy="1765080"/>
           </a:xfrm>
           <a:prstGeom prst="rect">
             <a:avLst/>
@@ -5965,7 +5993,7 @@
         <p:spPr>
           <a:xfrm>
             <a:off x="1562040" y="3558600"/>
-            <a:ext cx="9790560" cy="2617200"/>
+            <a:ext cx="9789840" cy="2616480"/>
           </a:xfrm>
           <a:prstGeom prst="rect">
             <a:avLst/>
@@ -6182,7 +6210,7 @@
       </p:sp>
     </p:spTree>
   </p:cSld>
-  <p:transition spd="med" advTm="10000">
+  <p:transition spd="med">
     <p:wipe dir="u"/>
   </p:transition>
   <p:timing>
@@ -6241,7 +6269,7 @@
         <p:spPr>
           <a:xfrm>
             <a:off x="2324160" y="365040"/>
-            <a:ext cx="9028800" cy="1324440"/>
+            <a:ext cx="9028080" cy="1323720"/>
           </a:xfrm>
           <a:prstGeom prst="rect">
             <a:avLst/>
@@ -6303,7 +6331,7 @@
         <p:spPr>
           <a:xfrm>
             <a:off x="1562040" y="1825560"/>
-            <a:ext cx="9790560" cy="4635720"/>
+            <a:ext cx="9789840" cy="4635000"/>
           </a:xfrm>
           <a:prstGeom prst="rect">
             <a:avLst/>
@@ -6358,7 +6386,7 @@
       </p:sp>
     </p:spTree>
   </p:cSld>
-  <p:transition spd="med" advTm="10000">
+  <p:transition spd="med">
     <p:wipe dir="u"/>
   </p:transition>
   <p:timing>
@@ -6416,8 +6444,8 @@
         </p:nvSpPr>
         <p:spPr>
           <a:xfrm>
-            <a:off x="2324160" y="365040"/>
-            <a:ext cx="9028800" cy="1324440"/>
+            <a:off x="2232000" y="0"/>
+            <a:ext cx="9028080" cy="1323720"/>
           </a:xfrm>
           <a:prstGeom prst="rect">
             <a:avLst/>
@@ -6478,8 +6506,8 @@
         </p:nvSpPr>
         <p:spPr>
           <a:xfrm>
-            <a:off x="1562040" y="4596840"/>
-            <a:ext cx="9790560" cy="1967040"/>
+            <a:off x="1513800" y="3816000"/>
+            <a:ext cx="9789840" cy="1966320"/>
           </a:xfrm>
           <a:prstGeom prst="rect">
             <a:avLst/>
@@ -6544,8 +6572,8 @@
         </p:blipFill>
         <p:spPr>
           <a:xfrm>
-            <a:off x="4627800" y="1690560"/>
-            <a:ext cx="3659400" cy="2744280"/>
+            <a:off x="4476960" y="1008000"/>
+            <a:ext cx="3658680" cy="2743560"/>
           </a:xfrm>
           <a:prstGeom prst="rect">
             <a:avLst/>
@@ -6557,7 +6585,7 @@
       </p:pic>
     </p:spTree>
   </p:cSld>
-  <p:transition spd="med" advTm="10000">
+  <p:transition spd="med">
     <p:wipe dir="u"/>
   </p:transition>
   <p:timing>
@@ -6616,7 +6644,7 @@
         <p:spPr>
           <a:xfrm>
             <a:off x="2324160" y="365040"/>
-            <a:ext cx="9028800" cy="1324440"/>
+            <a:ext cx="9028080" cy="1323720"/>
           </a:xfrm>
           <a:prstGeom prst="rect">
             <a:avLst/>
@@ -6678,7 +6706,7 @@
         <p:spPr>
           <a:xfrm>
             <a:off x="1562040" y="1825560"/>
-            <a:ext cx="9790560" cy="4648320"/>
+            <a:ext cx="9789840" cy="4647600"/>
           </a:xfrm>
           <a:prstGeom prst="rect">
             <a:avLst/>
@@ -6733,7 +6761,7 @@
       </p:sp>
     </p:spTree>
   </p:cSld>
-  <p:transition spd="med" advTm="10000">
+  <p:transition spd="med">
     <p:wipe dir="u"/>
   </p:transition>
   <p:timing>
@@ -6792,7 +6820,7 @@
         <p:spPr>
           <a:xfrm>
             <a:off x="2324160" y="365040"/>
-            <a:ext cx="9028800" cy="1324440"/>
+            <a:ext cx="9028080" cy="1323720"/>
           </a:xfrm>
           <a:prstGeom prst="rect">
             <a:avLst/>
@@ -6854,7 +6882,7 @@
         <p:spPr>
           <a:xfrm>
             <a:off x="1685520" y="4946760"/>
-            <a:ext cx="9790560" cy="1398240"/>
+            <a:ext cx="9789840" cy="1397520"/>
           </a:xfrm>
           <a:prstGeom prst="rect">
             <a:avLst/>
@@ -6920,7 +6948,7 @@
         <p:spPr>
           <a:xfrm>
             <a:off x="4532400" y="1690560"/>
-            <a:ext cx="4097160" cy="3072600"/>
+            <a:ext cx="4096440" cy="3071880"/>
           </a:xfrm>
           <a:prstGeom prst="rect">
             <a:avLst/>
@@ -6932,7 +6960,7 @@
       </p:pic>
     </p:spTree>
   </p:cSld>
-  <p:transition spd="med" advTm="10000">
+  <p:transition spd="med">
     <p:wipe dir="u"/>
   </p:transition>
   <p:timing>
@@ -6991,7 +7019,7 @@
         <p:spPr>
           <a:xfrm>
             <a:off x="2324160" y="365040"/>
-            <a:ext cx="9028800" cy="1324440"/>
+            <a:ext cx="9028080" cy="1323720"/>
           </a:xfrm>
           <a:prstGeom prst="rect">
             <a:avLst/>
@@ -7053,7 +7081,7 @@
         <p:spPr>
           <a:xfrm>
             <a:off x="1584000" y="1418040"/>
-            <a:ext cx="9790560" cy="1605960"/>
+            <a:ext cx="9789840" cy="1605240"/>
           </a:xfrm>
           <a:prstGeom prst="rect">
             <a:avLst/>
@@ -7119,7 +7147,7 @@
         <p:spPr>
           <a:xfrm>
             <a:off x="3571200" y="3432600"/>
-            <a:ext cx="5769360" cy="3245040"/>
+            <a:ext cx="5768640" cy="3244320"/>
           </a:xfrm>
           <a:prstGeom prst="rect">
             <a:avLst/>
@@ -7131,7 +7159,7 @@
       </p:pic>
     </p:spTree>
   </p:cSld>
-  <p:transition spd="med" advTm="10000">
+  <p:transition spd="med">
     <p:wipe dir="u"/>
   </p:transition>
   <p:timing>

</xml_diff>